<commit_message>
update demos and slides
</commit_message>
<xml_diff>
--- a/josh-corrick/5-Dbatools-cmdlets-you-can-use-now.pptx
+++ b/josh-corrick/5-Dbatools-cmdlets-you-can-use-now.pptx
@@ -21,7 +21,7 @@
     <p:sldId id="275" r:id="rId12"/>
     <p:sldId id="282" r:id="rId13"/>
   </p:sldIdLst>
-  <p:sldSz cx="9144000" cy="6858000" type="screen4x3"/>
+  <p:sldSz cx="12192000" cy="6858000"/>
   <p:notesSz cx="6858000" cy="9144000"/>
   <p:defaultTextStyle>
     <a:defPPr>
@@ -208,7 +208,7 @@
           <a:p>
             <a:fld id="{33DC0CB9-FB53-49B6-9064-69FE15A6B176}" type="datetimeFigureOut">
               <a:rPr lang="en-US" smtClean="0"/>
-              <a:t>7/16/2019</a:t>
+              <a:t>7/17/2019</a:t>
             </a:fld>
             <a:endParaRPr lang="en-US"/>
           </a:p>
@@ -226,8 +226,8 @@
         </p:nvSpPr>
         <p:spPr>
           <a:xfrm>
-            <a:off x="1371600" y="1143000"/>
-            <a:ext cx="4114800" cy="3086100"/>
+            <a:off x="685800" y="1143000"/>
+            <a:ext cx="5486400" cy="3086100"/>
           </a:xfrm>
           <a:prstGeom prst="rect">
             <a:avLst/>
@@ -502,7 +502,12 @@
             <p:ph type="sldImg"/>
           </p:nvPr>
         </p:nvSpPr>
-        <p:spPr/>
+        <p:spPr>
+          <a:xfrm>
+            <a:off x="685800" y="1143000"/>
+            <a:ext cx="5486400" cy="3086100"/>
+          </a:xfrm>
+        </p:spPr>
       </p:sp>
       <p:sp>
         <p:nvSpPr>
@@ -586,7 +591,12 @@
             <p:ph type="sldImg"/>
           </p:nvPr>
         </p:nvSpPr>
-        <p:spPr/>
+        <p:spPr>
+          <a:xfrm>
+            <a:off x="685800" y="1143000"/>
+            <a:ext cx="5486400" cy="3086100"/>
+          </a:xfrm>
+        </p:spPr>
       </p:sp>
       <p:sp>
         <p:nvSpPr>
@@ -705,7 +715,12 @@
             <p:ph type="sldImg"/>
           </p:nvPr>
         </p:nvSpPr>
-        <p:spPr/>
+        <p:spPr>
+          <a:xfrm>
+            <a:off x="685800" y="1143000"/>
+            <a:ext cx="5486400" cy="3086100"/>
+          </a:xfrm>
+        </p:spPr>
       </p:sp>
       <p:sp>
         <p:nvSpPr>
@@ -792,7 +807,12 @@
             <p:ph type="sldImg"/>
           </p:nvPr>
         </p:nvSpPr>
-        <p:spPr/>
+        <p:spPr>
+          <a:xfrm>
+            <a:off x="685800" y="1143000"/>
+            <a:ext cx="5486400" cy="3086100"/>
+          </a:xfrm>
+        </p:spPr>
       </p:sp>
       <p:sp>
         <p:nvSpPr>
@@ -1067,7 +1087,12 @@
             <p:ph type="sldImg"/>
           </p:nvPr>
         </p:nvSpPr>
-        <p:spPr/>
+        <p:spPr>
+          <a:xfrm>
+            <a:off x="685800" y="1143000"/>
+            <a:ext cx="5486400" cy="3086100"/>
+          </a:xfrm>
+        </p:spPr>
       </p:sp>
       <p:sp>
         <p:nvSpPr>
@@ -1153,8 +1178,8 @@
         </p:nvSpPr>
         <p:spPr>
           <a:xfrm>
-            <a:off x="685800" y="1122363"/>
-            <a:ext cx="7772400" cy="2387600"/>
+            <a:off x="914400" y="1122363"/>
+            <a:ext cx="10363200" cy="2387600"/>
           </a:xfrm>
         </p:spPr>
         <p:txBody>
@@ -1185,8 +1210,8 @@
         </p:nvSpPr>
         <p:spPr>
           <a:xfrm>
-            <a:off x="1143000" y="3602038"/>
-            <a:ext cx="6858000" cy="1655762"/>
+            <a:off x="1524000" y="3602038"/>
+            <a:ext cx="9144000" cy="1655762"/>
           </a:xfrm>
         </p:spPr>
         <p:txBody>
@@ -1255,7 +1280,7 @@
           <a:p>
             <a:fld id="{74980541-D290-4597-BC65-4F50E760C3E0}" type="datetimeFigureOut">
               <a:rPr lang="en-US" smtClean="0"/>
-              <a:t>7/16/2019</a:t>
+              <a:t>7/17/2019</a:t>
             </a:fld>
             <a:endParaRPr lang="en-US"/>
           </a:p>
@@ -1425,7 +1450,7 @@
           <a:p>
             <a:fld id="{74980541-D290-4597-BC65-4F50E760C3E0}" type="datetimeFigureOut">
               <a:rPr lang="en-US" smtClean="0"/>
-              <a:t>7/16/2019</a:t>
+              <a:t>7/17/2019</a:t>
             </a:fld>
             <a:endParaRPr lang="en-US"/>
           </a:p>
@@ -1515,8 +1540,8 @@
         </p:nvSpPr>
         <p:spPr>
           <a:xfrm>
-            <a:off x="6543675" y="365125"/>
-            <a:ext cx="1971675" cy="5811838"/>
+            <a:off x="8724901" y="365125"/>
+            <a:ext cx="2628900" cy="5811838"/>
           </a:xfrm>
         </p:spPr>
         <p:txBody>
@@ -1543,8 +1568,8 @@
         </p:nvSpPr>
         <p:spPr>
           <a:xfrm>
-            <a:off x="628650" y="365125"/>
-            <a:ext cx="5800725" cy="5811838"/>
+            <a:off x="838201" y="365125"/>
+            <a:ext cx="7734300" cy="5811838"/>
           </a:xfrm>
         </p:spPr>
         <p:txBody>
@@ -1605,7 +1630,7 @@
           <a:p>
             <a:fld id="{74980541-D290-4597-BC65-4F50E760C3E0}" type="datetimeFigureOut">
               <a:rPr lang="en-US" smtClean="0"/>
-              <a:t>7/16/2019</a:t>
+              <a:t>7/17/2019</a:t>
             </a:fld>
             <a:endParaRPr lang="en-US"/>
           </a:p>
@@ -1775,7 +1800,7 @@
           <a:p>
             <a:fld id="{74980541-D290-4597-BC65-4F50E760C3E0}" type="datetimeFigureOut">
               <a:rPr lang="en-US" smtClean="0"/>
-              <a:t>7/16/2019</a:t>
+              <a:t>7/17/2019</a:t>
             </a:fld>
             <a:endParaRPr lang="en-US"/>
           </a:p>
@@ -1865,8 +1890,8 @@
         </p:nvSpPr>
         <p:spPr>
           <a:xfrm>
-            <a:off x="623888" y="1709739"/>
-            <a:ext cx="7886700" cy="2852737"/>
+            <a:off x="831851" y="1709740"/>
+            <a:ext cx="10515600" cy="2852737"/>
           </a:xfrm>
         </p:spPr>
         <p:txBody>
@@ -1897,8 +1922,8 @@
         </p:nvSpPr>
         <p:spPr>
           <a:xfrm>
-            <a:off x="623888" y="4589464"/>
-            <a:ext cx="7886700" cy="1500187"/>
+            <a:off x="831851" y="4589465"/>
+            <a:ext cx="10515600" cy="1500187"/>
           </a:xfrm>
         </p:spPr>
         <p:txBody>
@@ -2019,7 +2044,7 @@
           <a:p>
             <a:fld id="{74980541-D290-4597-BC65-4F50E760C3E0}" type="datetimeFigureOut">
               <a:rPr lang="en-US" smtClean="0"/>
-              <a:t>7/16/2019</a:t>
+              <a:t>7/17/2019</a:t>
             </a:fld>
             <a:endParaRPr lang="en-US"/>
           </a:p>
@@ -2132,8 +2157,8 @@
         </p:nvSpPr>
         <p:spPr>
           <a:xfrm>
-            <a:off x="628650" y="1825625"/>
-            <a:ext cx="3886200" cy="4351338"/>
+            <a:off x="838200" y="1825625"/>
+            <a:ext cx="5181600" cy="4351338"/>
           </a:xfrm>
         </p:spPr>
         <p:txBody>
@@ -2189,8 +2214,8 @@
         </p:nvSpPr>
         <p:spPr>
           <a:xfrm>
-            <a:off x="4629150" y="1825625"/>
-            <a:ext cx="3886200" cy="4351338"/>
+            <a:off x="6172200" y="1825625"/>
+            <a:ext cx="5181600" cy="4351338"/>
           </a:xfrm>
         </p:spPr>
         <p:txBody>
@@ -2251,7 +2276,7 @@
           <a:p>
             <a:fld id="{74980541-D290-4597-BC65-4F50E760C3E0}" type="datetimeFigureOut">
               <a:rPr lang="en-US" smtClean="0"/>
-              <a:t>7/16/2019</a:t>
+              <a:t>7/17/2019</a:t>
             </a:fld>
             <a:endParaRPr lang="en-US"/>
           </a:p>
@@ -2341,8 +2366,8 @@
         </p:nvSpPr>
         <p:spPr>
           <a:xfrm>
-            <a:off x="629841" y="365126"/>
-            <a:ext cx="7886700" cy="1325563"/>
+            <a:off x="839788" y="365127"/>
+            <a:ext cx="10515600" cy="1325563"/>
           </a:xfrm>
         </p:spPr>
         <p:txBody>
@@ -2369,8 +2394,8 @@
         </p:nvSpPr>
         <p:spPr>
           <a:xfrm>
-            <a:off x="629842" y="1681163"/>
-            <a:ext cx="3868340" cy="823912"/>
+            <a:off x="839789" y="1681163"/>
+            <a:ext cx="5157787" cy="823912"/>
           </a:xfrm>
         </p:spPr>
         <p:txBody>
@@ -2434,8 +2459,8 @@
         </p:nvSpPr>
         <p:spPr>
           <a:xfrm>
-            <a:off x="629842" y="2505075"/>
-            <a:ext cx="3868340" cy="3684588"/>
+            <a:off x="839789" y="2505075"/>
+            <a:ext cx="5157787" cy="3684588"/>
           </a:xfrm>
         </p:spPr>
         <p:txBody>
@@ -2491,8 +2516,8 @@
         </p:nvSpPr>
         <p:spPr>
           <a:xfrm>
-            <a:off x="4629150" y="1681163"/>
-            <a:ext cx="3887391" cy="823912"/>
+            <a:off x="6172201" y="1681163"/>
+            <a:ext cx="5183188" cy="823912"/>
           </a:xfrm>
         </p:spPr>
         <p:txBody>
@@ -2556,8 +2581,8 @@
         </p:nvSpPr>
         <p:spPr>
           <a:xfrm>
-            <a:off x="4629150" y="2505075"/>
-            <a:ext cx="3887391" cy="3684588"/>
+            <a:off x="6172201" y="2505075"/>
+            <a:ext cx="5183188" cy="3684588"/>
           </a:xfrm>
         </p:spPr>
         <p:txBody>
@@ -2618,7 +2643,7 @@
           <a:p>
             <a:fld id="{74980541-D290-4597-BC65-4F50E760C3E0}" type="datetimeFigureOut">
               <a:rPr lang="en-US" smtClean="0"/>
-              <a:t>7/16/2019</a:t>
+              <a:t>7/17/2019</a:t>
             </a:fld>
             <a:endParaRPr lang="en-US"/>
           </a:p>
@@ -2736,7 +2761,7 @@
           <a:p>
             <a:fld id="{74980541-D290-4597-BC65-4F50E760C3E0}" type="datetimeFigureOut">
               <a:rPr lang="en-US" smtClean="0"/>
-              <a:t>7/16/2019</a:t>
+              <a:t>7/17/2019</a:t>
             </a:fld>
             <a:endParaRPr lang="en-US"/>
           </a:p>
@@ -2831,7 +2856,7 @@
           <a:p>
             <a:fld id="{74980541-D290-4597-BC65-4F50E760C3E0}" type="datetimeFigureOut">
               <a:rPr lang="en-US" smtClean="0"/>
-              <a:t>7/16/2019</a:t>
+              <a:t>7/17/2019</a:t>
             </a:fld>
             <a:endParaRPr lang="en-US"/>
           </a:p>
@@ -2921,8 +2946,8 @@
         </p:nvSpPr>
         <p:spPr>
           <a:xfrm>
-            <a:off x="629841" y="457200"/>
-            <a:ext cx="2949178" cy="1600200"/>
+            <a:off x="839788" y="457200"/>
+            <a:ext cx="3932237" cy="1600200"/>
           </a:xfrm>
         </p:spPr>
         <p:txBody>
@@ -2953,8 +2978,8 @@
         </p:nvSpPr>
         <p:spPr>
           <a:xfrm>
-            <a:off x="3887391" y="987426"/>
-            <a:ext cx="4629150" cy="4873625"/>
+            <a:off x="5183188" y="987427"/>
+            <a:ext cx="6172200" cy="4873625"/>
           </a:xfrm>
         </p:spPr>
         <p:txBody>
@@ -3038,8 +3063,8 @@
         </p:nvSpPr>
         <p:spPr>
           <a:xfrm>
-            <a:off x="629841" y="2057400"/>
-            <a:ext cx="2949178" cy="3811588"/>
+            <a:off x="839788" y="2057400"/>
+            <a:ext cx="3932237" cy="3811588"/>
           </a:xfrm>
         </p:spPr>
         <p:txBody>
@@ -3108,7 +3133,7 @@
           <a:p>
             <a:fld id="{74980541-D290-4597-BC65-4F50E760C3E0}" type="datetimeFigureOut">
               <a:rPr lang="en-US" smtClean="0"/>
-              <a:t>7/16/2019</a:t>
+              <a:t>7/17/2019</a:t>
             </a:fld>
             <a:endParaRPr lang="en-US"/>
           </a:p>
@@ -3198,8 +3223,8 @@
         </p:nvSpPr>
         <p:spPr>
           <a:xfrm>
-            <a:off x="629841" y="457200"/>
-            <a:ext cx="2949178" cy="1600200"/>
+            <a:off x="839788" y="457200"/>
+            <a:ext cx="3932237" cy="1600200"/>
           </a:xfrm>
         </p:spPr>
         <p:txBody>
@@ -3230,8 +3255,8 @@
         </p:nvSpPr>
         <p:spPr>
           <a:xfrm>
-            <a:off x="3887391" y="987426"/>
-            <a:ext cx="4629150" cy="4873625"/>
+            <a:off x="5183188" y="987427"/>
+            <a:ext cx="6172200" cy="4873625"/>
           </a:xfrm>
         </p:spPr>
         <p:txBody>
@@ -3295,8 +3320,8 @@
         </p:nvSpPr>
         <p:spPr>
           <a:xfrm>
-            <a:off x="629841" y="2057400"/>
-            <a:ext cx="2949178" cy="3811588"/>
+            <a:off x="839788" y="2057400"/>
+            <a:ext cx="3932237" cy="3811588"/>
           </a:xfrm>
         </p:spPr>
         <p:txBody>
@@ -3365,7 +3390,7 @@
           <a:p>
             <a:fld id="{74980541-D290-4597-BC65-4F50E760C3E0}" type="datetimeFigureOut">
               <a:rPr lang="en-US" smtClean="0"/>
-              <a:t>7/16/2019</a:t>
+              <a:t>7/17/2019</a:t>
             </a:fld>
             <a:endParaRPr lang="en-US"/>
           </a:p>
@@ -3460,8 +3485,8 @@
         </p:nvSpPr>
         <p:spPr>
           <a:xfrm>
-            <a:off x="628650" y="365126"/>
-            <a:ext cx="7886700" cy="1325563"/>
+            <a:off x="838200" y="365127"/>
+            <a:ext cx="10515600" cy="1325563"/>
           </a:xfrm>
           <a:prstGeom prst="rect">
             <a:avLst/>
@@ -3493,8 +3518,8 @@
         </p:nvSpPr>
         <p:spPr>
           <a:xfrm>
-            <a:off x="628650" y="1825625"/>
-            <a:ext cx="7886700" cy="4351338"/>
+            <a:off x="838200" y="1825625"/>
+            <a:ext cx="10515600" cy="4351338"/>
           </a:xfrm>
           <a:prstGeom prst="rect">
             <a:avLst/>
@@ -3555,8 +3580,8 @@
         </p:nvSpPr>
         <p:spPr>
           <a:xfrm>
-            <a:off x="628650" y="6356351"/>
-            <a:ext cx="2057400" cy="365125"/>
+            <a:off x="838200" y="6356352"/>
+            <a:ext cx="2743200" cy="365125"/>
           </a:xfrm>
           <a:prstGeom prst="rect">
             <a:avLst/>
@@ -3578,7 +3603,7 @@
           <a:p>
             <a:fld id="{74980541-D290-4597-BC65-4F50E760C3E0}" type="datetimeFigureOut">
               <a:rPr lang="en-US" smtClean="0"/>
-              <a:t>7/16/2019</a:t>
+              <a:t>7/17/2019</a:t>
             </a:fld>
             <a:endParaRPr lang="en-US"/>
           </a:p>
@@ -3596,8 +3621,8 @@
         </p:nvSpPr>
         <p:spPr>
           <a:xfrm>
-            <a:off x="3028950" y="6356351"/>
-            <a:ext cx="3086100" cy="365125"/>
+            <a:off x="4038600" y="6356352"/>
+            <a:ext cx="4114800" cy="365125"/>
           </a:xfrm>
           <a:prstGeom prst="rect">
             <a:avLst/>
@@ -3633,8 +3658,8 @@
         </p:nvSpPr>
         <p:spPr>
           <a:xfrm>
-            <a:off x="6457950" y="6356351"/>
-            <a:ext cx="2057400" cy="365125"/>
+            <a:off x="8610600" y="6356352"/>
+            <a:ext cx="2743200" cy="365125"/>
           </a:xfrm>
           <a:prstGeom prst="rect">
             <a:avLst/>
@@ -4064,35 +4089,6 @@
       </p:sp>
       <p:pic>
         <p:nvPicPr>
-          <p:cNvPr id="4" name="Content Placeholder 5">
-            <a:extLst>
-              <a:ext uri="{FF2B5EF4-FFF2-40B4-BE49-F238E27FC236}">
-                <a16:creationId xmlns:a16="http://schemas.microsoft.com/office/drawing/2014/main" id="{D11BF1CB-9FA0-4C4B-A2E0-7BB5A10006E1}"/>
-              </a:ext>
-            </a:extLst>
-          </p:cNvPr>
-          <p:cNvPicPr>
-            <a:picLocks noGrp="1" noChangeAspect="1"/>
-          </p:cNvPicPr>
-          <p:nvPr>
-            <p:ph sz="half" idx="2"/>
-          </p:nvPr>
-        </p:nvPicPr>
-        <p:blipFill>
-          <a:blip r:embed="rId3"/>
-          <a:stretch>
-            <a:fillRect/>
-          </a:stretch>
-        </p:blipFill>
-        <p:spPr>
-          <a:xfrm>
-            <a:off x="991665" y="3602038"/>
-            <a:ext cx="1755390" cy="1755390"/>
-          </a:xfrm>
-        </p:spPr>
-      </p:pic>
-      <p:pic>
-        <p:nvPicPr>
           <p:cNvPr id="5" name="Content Placeholder 5">
             <a:extLst>
               <a:ext uri="{FF2B5EF4-FFF2-40B4-BE49-F238E27FC236}">
@@ -4104,7 +4100,7 @@
             <a:picLocks noGrp="1" noChangeAspect="1"/>
           </p:cNvPicPr>
           <p:nvPr>
-            <p:ph sz="half" idx="2"/>
+            <p:ph sz="half" idx="4294967295"/>
           </p:nvPr>
         </p:nvPicPr>
         <p:blipFill>
@@ -4115,8 +4111,8 @@
         </p:blipFill>
         <p:spPr>
           <a:xfrm>
-            <a:off x="991665" y="3694113"/>
-            <a:ext cx="1755390" cy="1755390"/>
+            <a:off x="8155858" y="3602038"/>
+            <a:ext cx="1754188" cy="1755775"/>
           </a:xfrm>
         </p:spPr>
       </p:pic>
@@ -4289,7 +4285,7 @@
         </p:nvSpPr>
         <p:spPr>
           <a:xfrm>
-            <a:off x="628649" y="1825625"/>
+            <a:off x="2152650" y="1825625"/>
             <a:ext cx="4269921" cy="4351338"/>
           </a:xfrm>
         </p:spPr>
@@ -4364,7 +4360,7 @@
         </p:blipFill>
         <p:spPr>
           <a:xfrm>
-            <a:off x="5119781" y="1921712"/>
+            <a:off x="6643781" y="1921712"/>
             <a:ext cx="1755390" cy="1755390"/>
           </a:xfrm>
         </p:spPr>
@@ -4841,7 +4837,7 @@
         </p:nvSpPr>
         <p:spPr>
           <a:xfrm>
-            <a:off x="628649" y="1825625"/>
+            <a:off x="2152650" y="1825625"/>
             <a:ext cx="4269921" cy="4351338"/>
           </a:xfrm>
         </p:spPr>
@@ -5499,7 +5495,7 @@
         </p:blipFill>
         <p:spPr>
           <a:xfrm>
-            <a:off x="5012445" y="2000133"/>
+            <a:off x="7318109" y="2036116"/>
             <a:ext cx="2785768" cy="2785768"/>
           </a:xfrm>
         </p:spPr>
@@ -5589,7 +5585,7 @@
         <p:spPr/>
         <p:txBody>
           <a:bodyPr>
-            <a:normAutofit fontScale="92500" lnSpcReduction="10000"/>
+            <a:normAutofit/>
           </a:bodyPr>
           <a:lstStyle/>
           <a:p>
@@ -5674,7 +5670,7 @@
         </p:blipFill>
         <p:spPr>
           <a:xfrm>
-            <a:off x="4572631" y="2000133"/>
+            <a:off x="6096631" y="2000133"/>
             <a:ext cx="4285344" cy="3214008"/>
           </a:xfrm>
           <a:prstGeom prst="rect">
@@ -5850,7 +5846,7 @@
         </p:blipFill>
         <p:spPr>
           <a:xfrm>
-            <a:off x="286026" y="2330740"/>
+            <a:off x="1810026" y="2330740"/>
             <a:ext cx="4285344" cy="2196520"/>
           </a:xfrm>
         </p:spPr>
@@ -5871,9 +5867,16 @@
             <p:ph sz="half" idx="2"/>
           </p:nvPr>
         </p:nvSpPr>
-        <p:spPr/>
-        <p:txBody>
-          <a:bodyPr/>
+        <p:spPr>
+          <a:xfrm>
+            <a:off x="6153150" y="1565926"/>
+            <a:ext cx="4228824" cy="4351338"/>
+          </a:xfrm>
+        </p:spPr>
+        <p:txBody>
+          <a:bodyPr>
+            <a:normAutofit/>
+          </a:bodyPr>
           <a:lstStyle/>
           <a:p>
             <a:pPr marL="362880" indent="-362880"/>
@@ -5954,7 +5957,7 @@
         </p:nvSpPr>
         <p:spPr>
           <a:xfrm>
-            <a:off x="286026" y="6578166"/>
+            <a:off x="1810026" y="6578166"/>
             <a:ext cx="8327546" cy="238848"/>
           </a:xfrm>
           <a:prstGeom prst="rect">
@@ -6878,7 +6881,7 @@
         </p:nvSpPr>
         <p:spPr>
           <a:xfrm>
-            <a:off x="623888" y="1709739"/>
+            <a:off x="2147888" y="1709740"/>
             <a:ext cx="7965308" cy="2852737"/>
           </a:xfrm>
         </p:spPr>

</xml_diff>

<commit_message>
update demos and slides (#14)
</commit_message>
<xml_diff>
--- a/josh-corrick/5-Dbatools-cmdlets-you-can-use-now.pptx
+++ b/josh-corrick/5-Dbatools-cmdlets-you-can-use-now.pptx
@@ -21,7 +21,7 @@
     <p:sldId id="275" r:id="rId12"/>
     <p:sldId id="282" r:id="rId13"/>
   </p:sldIdLst>
-  <p:sldSz cx="9144000" cy="6858000" type="screen4x3"/>
+  <p:sldSz cx="12192000" cy="6858000"/>
   <p:notesSz cx="6858000" cy="9144000"/>
   <p:defaultTextStyle>
     <a:defPPr>
@@ -208,7 +208,7 @@
           <a:p>
             <a:fld id="{33DC0CB9-FB53-49B6-9064-69FE15A6B176}" type="datetimeFigureOut">
               <a:rPr lang="en-US" smtClean="0"/>
-              <a:t>7/16/2019</a:t>
+              <a:t>7/17/2019</a:t>
             </a:fld>
             <a:endParaRPr lang="en-US"/>
           </a:p>
@@ -226,8 +226,8 @@
         </p:nvSpPr>
         <p:spPr>
           <a:xfrm>
-            <a:off x="1371600" y="1143000"/>
-            <a:ext cx="4114800" cy="3086100"/>
+            <a:off x="685800" y="1143000"/>
+            <a:ext cx="5486400" cy="3086100"/>
           </a:xfrm>
           <a:prstGeom prst="rect">
             <a:avLst/>
@@ -502,7 +502,12 @@
             <p:ph type="sldImg"/>
           </p:nvPr>
         </p:nvSpPr>
-        <p:spPr/>
+        <p:spPr>
+          <a:xfrm>
+            <a:off x="685800" y="1143000"/>
+            <a:ext cx="5486400" cy="3086100"/>
+          </a:xfrm>
+        </p:spPr>
       </p:sp>
       <p:sp>
         <p:nvSpPr>
@@ -586,7 +591,12 @@
             <p:ph type="sldImg"/>
           </p:nvPr>
         </p:nvSpPr>
-        <p:spPr/>
+        <p:spPr>
+          <a:xfrm>
+            <a:off x="685800" y="1143000"/>
+            <a:ext cx="5486400" cy="3086100"/>
+          </a:xfrm>
+        </p:spPr>
       </p:sp>
       <p:sp>
         <p:nvSpPr>
@@ -705,7 +715,12 @@
             <p:ph type="sldImg"/>
           </p:nvPr>
         </p:nvSpPr>
-        <p:spPr/>
+        <p:spPr>
+          <a:xfrm>
+            <a:off x="685800" y="1143000"/>
+            <a:ext cx="5486400" cy="3086100"/>
+          </a:xfrm>
+        </p:spPr>
       </p:sp>
       <p:sp>
         <p:nvSpPr>
@@ -792,7 +807,12 @@
             <p:ph type="sldImg"/>
           </p:nvPr>
         </p:nvSpPr>
-        <p:spPr/>
+        <p:spPr>
+          <a:xfrm>
+            <a:off x="685800" y="1143000"/>
+            <a:ext cx="5486400" cy="3086100"/>
+          </a:xfrm>
+        </p:spPr>
       </p:sp>
       <p:sp>
         <p:nvSpPr>
@@ -1067,7 +1087,12 @@
             <p:ph type="sldImg"/>
           </p:nvPr>
         </p:nvSpPr>
-        <p:spPr/>
+        <p:spPr>
+          <a:xfrm>
+            <a:off x="685800" y="1143000"/>
+            <a:ext cx="5486400" cy="3086100"/>
+          </a:xfrm>
+        </p:spPr>
       </p:sp>
       <p:sp>
         <p:nvSpPr>
@@ -1153,8 +1178,8 @@
         </p:nvSpPr>
         <p:spPr>
           <a:xfrm>
-            <a:off x="685800" y="1122363"/>
-            <a:ext cx="7772400" cy="2387600"/>
+            <a:off x="914400" y="1122363"/>
+            <a:ext cx="10363200" cy="2387600"/>
           </a:xfrm>
         </p:spPr>
         <p:txBody>
@@ -1185,8 +1210,8 @@
         </p:nvSpPr>
         <p:spPr>
           <a:xfrm>
-            <a:off x="1143000" y="3602038"/>
-            <a:ext cx="6858000" cy="1655762"/>
+            <a:off x="1524000" y="3602038"/>
+            <a:ext cx="9144000" cy="1655762"/>
           </a:xfrm>
         </p:spPr>
         <p:txBody>
@@ -1255,7 +1280,7 @@
           <a:p>
             <a:fld id="{74980541-D290-4597-BC65-4F50E760C3E0}" type="datetimeFigureOut">
               <a:rPr lang="en-US" smtClean="0"/>
-              <a:t>7/16/2019</a:t>
+              <a:t>7/17/2019</a:t>
             </a:fld>
             <a:endParaRPr lang="en-US"/>
           </a:p>
@@ -1425,7 +1450,7 @@
           <a:p>
             <a:fld id="{74980541-D290-4597-BC65-4F50E760C3E0}" type="datetimeFigureOut">
               <a:rPr lang="en-US" smtClean="0"/>
-              <a:t>7/16/2019</a:t>
+              <a:t>7/17/2019</a:t>
             </a:fld>
             <a:endParaRPr lang="en-US"/>
           </a:p>
@@ -1515,8 +1540,8 @@
         </p:nvSpPr>
         <p:spPr>
           <a:xfrm>
-            <a:off x="6543675" y="365125"/>
-            <a:ext cx="1971675" cy="5811838"/>
+            <a:off x="8724901" y="365125"/>
+            <a:ext cx="2628900" cy="5811838"/>
           </a:xfrm>
         </p:spPr>
         <p:txBody>
@@ -1543,8 +1568,8 @@
         </p:nvSpPr>
         <p:spPr>
           <a:xfrm>
-            <a:off x="628650" y="365125"/>
-            <a:ext cx="5800725" cy="5811838"/>
+            <a:off x="838201" y="365125"/>
+            <a:ext cx="7734300" cy="5811838"/>
           </a:xfrm>
         </p:spPr>
         <p:txBody>
@@ -1605,7 +1630,7 @@
           <a:p>
             <a:fld id="{74980541-D290-4597-BC65-4F50E760C3E0}" type="datetimeFigureOut">
               <a:rPr lang="en-US" smtClean="0"/>
-              <a:t>7/16/2019</a:t>
+              <a:t>7/17/2019</a:t>
             </a:fld>
             <a:endParaRPr lang="en-US"/>
           </a:p>
@@ -1775,7 +1800,7 @@
           <a:p>
             <a:fld id="{74980541-D290-4597-BC65-4F50E760C3E0}" type="datetimeFigureOut">
               <a:rPr lang="en-US" smtClean="0"/>
-              <a:t>7/16/2019</a:t>
+              <a:t>7/17/2019</a:t>
             </a:fld>
             <a:endParaRPr lang="en-US"/>
           </a:p>
@@ -1865,8 +1890,8 @@
         </p:nvSpPr>
         <p:spPr>
           <a:xfrm>
-            <a:off x="623888" y="1709739"/>
-            <a:ext cx="7886700" cy="2852737"/>
+            <a:off x="831851" y="1709740"/>
+            <a:ext cx="10515600" cy="2852737"/>
           </a:xfrm>
         </p:spPr>
         <p:txBody>
@@ -1897,8 +1922,8 @@
         </p:nvSpPr>
         <p:spPr>
           <a:xfrm>
-            <a:off x="623888" y="4589464"/>
-            <a:ext cx="7886700" cy="1500187"/>
+            <a:off x="831851" y="4589465"/>
+            <a:ext cx="10515600" cy="1500187"/>
           </a:xfrm>
         </p:spPr>
         <p:txBody>
@@ -2019,7 +2044,7 @@
           <a:p>
             <a:fld id="{74980541-D290-4597-BC65-4F50E760C3E0}" type="datetimeFigureOut">
               <a:rPr lang="en-US" smtClean="0"/>
-              <a:t>7/16/2019</a:t>
+              <a:t>7/17/2019</a:t>
             </a:fld>
             <a:endParaRPr lang="en-US"/>
           </a:p>
@@ -2132,8 +2157,8 @@
         </p:nvSpPr>
         <p:spPr>
           <a:xfrm>
-            <a:off x="628650" y="1825625"/>
-            <a:ext cx="3886200" cy="4351338"/>
+            <a:off x="838200" y="1825625"/>
+            <a:ext cx="5181600" cy="4351338"/>
           </a:xfrm>
         </p:spPr>
         <p:txBody>
@@ -2189,8 +2214,8 @@
         </p:nvSpPr>
         <p:spPr>
           <a:xfrm>
-            <a:off x="4629150" y="1825625"/>
-            <a:ext cx="3886200" cy="4351338"/>
+            <a:off x="6172200" y="1825625"/>
+            <a:ext cx="5181600" cy="4351338"/>
           </a:xfrm>
         </p:spPr>
         <p:txBody>
@@ -2251,7 +2276,7 @@
           <a:p>
             <a:fld id="{74980541-D290-4597-BC65-4F50E760C3E0}" type="datetimeFigureOut">
               <a:rPr lang="en-US" smtClean="0"/>
-              <a:t>7/16/2019</a:t>
+              <a:t>7/17/2019</a:t>
             </a:fld>
             <a:endParaRPr lang="en-US"/>
           </a:p>
@@ -2341,8 +2366,8 @@
         </p:nvSpPr>
         <p:spPr>
           <a:xfrm>
-            <a:off x="629841" y="365126"/>
-            <a:ext cx="7886700" cy="1325563"/>
+            <a:off x="839788" y="365127"/>
+            <a:ext cx="10515600" cy="1325563"/>
           </a:xfrm>
         </p:spPr>
         <p:txBody>
@@ -2369,8 +2394,8 @@
         </p:nvSpPr>
         <p:spPr>
           <a:xfrm>
-            <a:off x="629842" y="1681163"/>
-            <a:ext cx="3868340" cy="823912"/>
+            <a:off x="839789" y="1681163"/>
+            <a:ext cx="5157787" cy="823912"/>
           </a:xfrm>
         </p:spPr>
         <p:txBody>
@@ -2434,8 +2459,8 @@
         </p:nvSpPr>
         <p:spPr>
           <a:xfrm>
-            <a:off x="629842" y="2505075"/>
-            <a:ext cx="3868340" cy="3684588"/>
+            <a:off x="839789" y="2505075"/>
+            <a:ext cx="5157787" cy="3684588"/>
           </a:xfrm>
         </p:spPr>
         <p:txBody>
@@ -2491,8 +2516,8 @@
         </p:nvSpPr>
         <p:spPr>
           <a:xfrm>
-            <a:off x="4629150" y="1681163"/>
-            <a:ext cx="3887391" cy="823912"/>
+            <a:off x="6172201" y="1681163"/>
+            <a:ext cx="5183188" cy="823912"/>
           </a:xfrm>
         </p:spPr>
         <p:txBody>
@@ -2556,8 +2581,8 @@
         </p:nvSpPr>
         <p:spPr>
           <a:xfrm>
-            <a:off x="4629150" y="2505075"/>
-            <a:ext cx="3887391" cy="3684588"/>
+            <a:off x="6172201" y="2505075"/>
+            <a:ext cx="5183188" cy="3684588"/>
           </a:xfrm>
         </p:spPr>
         <p:txBody>
@@ -2618,7 +2643,7 @@
           <a:p>
             <a:fld id="{74980541-D290-4597-BC65-4F50E760C3E0}" type="datetimeFigureOut">
               <a:rPr lang="en-US" smtClean="0"/>
-              <a:t>7/16/2019</a:t>
+              <a:t>7/17/2019</a:t>
             </a:fld>
             <a:endParaRPr lang="en-US"/>
           </a:p>
@@ -2736,7 +2761,7 @@
           <a:p>
             <a:fld id="{74980541-D290-4597-BC65-4F50E760C3E0}" type="datetimeFigureOut">
               <a:rPr lang="en-US" smtClean="0"/>
-              <a:t>7/16/2019</a:t>
+              <a:t>7/17/2019</a:t>
             </a:fld>
             <a:endParaRPr lang="en-US"/>
           </a:p>
@@ -2831,7 +2856,7 @@
           <a:p>
             <a:fld id="{74980541-D290-4597-BC65-4F50E760C3E0}" type="datetimeFigureOut">
               <a:rPr lang="en-US" smtClean="0"/>
-              <a:t>7/16/2019</a:t>
+              <a:t>7/17/2019</a:t>
             </a:fld>
             <a:endParaRPr lang="en-US"/>
           </a:p>
@@ -2921,8 +2946,8 @@
         </p:nvSpPr>
         <p:spPr>
           <a:xfrm>
-            <a:off x="629841" y="457200"/>
-            <a:ext cx="2949178" cy="1600200"/>
+            <a:off x="839788" y="457200"/>
+            <a:ext cx="3932237" cy="1600200"/>
           </a:xfrm>
         </p:spPr>
         <p:txBody>
@@ -2953,8 +2978,8 @@
         </p:nvSpPr>
         <p:spPr>
           <a:xfrm>
-            <a:off x="3887391" y="987426"/>
-            <a:ext cx="4629150" cy="4873625"/>
+            <a:off x="5183188" y="987427"/>
+            <a:ext cx="6172200" cy="4873625"/>
           </a:xfrm>
         </p:spPr>
         <p:txBody>
@@ -3038,8 +3063,8 @@
         </p:nvSpPr>
         <p:spPr>
           <a:xfrm>
-            <a:off x="629841" y="2057400"/>
-            <a:ext cx="2949178" cy="3811588"/>
+            <a:off x="839788" y="2057400"/>
+            <a:ext cx="3932237" cy="3811588"/>
           </a:xfrm>
         </p:spPr>
         <p:txBody>
@@ -3108,7 +3133,7 @@
           <a:p>
             <a:fld id="{74980541-D290-4597-BC65-4F50E760C3E0}" type="datetimeFigureOut">
               <a:rPr lang="en-US" smtClean="0"/>
-              <a:t>7/16/2019</a:t>
+              <a:t>7/17/2019</a:t>
             </a:fld>
             <a:endParaRPr lang="en-US"/>
           </a:p>
@@ -3198,8 +3223,8 @@
         </p:nvSpPr>
         <p:spPr>
           <a:xfrm>
-            <a:off x="629841" y="457200"/>
-            <a:ext cx="2949178" cy="1600200"/>
+            <a:off x="839788" y="457200"/>
+            <a:ext cx="3932237" cy="1600200"/>
           </a:xfrm>
         </p:spPr>
         <p:txBody>
@@ -3230,8 +3255,8 @@
         </p:nvSpPr>
         <p:spPr>
           <a:xfrm>
-            <a:off x="3887391" y="987426"/>
-            <a:ext cx="4629150" cy="4873625"/>
+            <a:off x="5183188" y="987427"/>
+            <a:ext cx="6172200" cy="4873625"/>
           </a:xfrm>
         </p:spPr>
         <p:txBody>
@@ -3295,8 +3320,8 @@
         </p:nvSpPr>
         <p:spPr>
           <a:xfrm>
-            <a:off x="629841" y="2057400"/>
-            <a:ext cx="2949178" cy="3811588"/>
+            <a:off x="839788" y="2057400"/>
+            <a:ext cx="3932237" cy="3811588"/>
           </a:xfrm>
         </p:spPr>
         <p:txBody>
@@ -3365,7 +3390,7 @@
           <a:p>
             <a:fld id="{74980541-D290-4597-BC65-4F50E760C3E0}" type="datetimeFigureOut">
               <a:rPr lang="en-US" smtClean="0"/>
-              <a:t>7/16/2019</a:t>
+              <a:t>7/17/2019</a:t>
             </a:fld>
             <a:endParaRPr lang="en-US"/>
           </a:p>
@@ -3460,8 +3485,8 @@
         </p:nvSpPr>
         <p:spPr>
           <a:xfrm>
-            <a:off x="628650" y="365126"/>
-            <a:ext cx="7886700" cy="1325563"/>
+            <a:off x="838200" y="365127"/>
+            <a:ext cx="10515600" cy="1325563"/>
           </a:xfrm>
           <a:prstGeom prst="rect">
             <a:avLst/>
@@ -3493,8 +3518,8 @@
         </p:nvSpPr>
         <p:spPr>
           <a:xfrm>
-            <a:off x="628650" y="1825625"/>
-            <a:ext cx="7886700" cy="4351338"/>
+            <a:off x="838200" y="1825625"/>
+            <a:ext cx="10515600" cy="4351338"/>
           </a:xfrm>
           <a:prstGeom prst="rect">
             <a:avLst/>
@@ -3555,8 +3580,8 @@
         </p:nvSpPr>
         <p:spPr>
           <a:xfrm>
-            <a:off x="628650" y="6356351"/>
-            <a:ext cx="2057400" cy="365125"/>
+            <a:off x="838200" y="6356352"/>
+            <a:ext cx="2743200" cy="365125"/>
           </a:xfrm>
           <a:prstGeom prst="rect">
             <a:avLst/>
@@ -3578,7 +3603,7 @@
           <a:p>
             <a:fld id="{74980541-D290-4597-BC65-4F50E760C3E0}" type="datetimeFigureOut">
               <a:rPr lang="en-US" smtClean="0"/>
-              <a:t>7/16/2019</a:t>
+              <a:t>7/17/2019</a:t>
             </a:fld>
             <a:endParaRPr lang="en-US"/>
           </a:p>
@@ -3596,8 +3621,8 @@
         </p:nvSpPr>
         <p:spPr>
           <a:xfrm>
-            <a:off x="3028950" y="6356351"/>
-            <a:ext cx="3086100" cy="365125"/>
+            <a:off x="4038600" y="6356352"/>
+            <a:ext cx="4114800" cy="365125"/>
           </a:xfrm>
           <a:prstGeom prst="rect">
             <a:avLst/>
@@ -3633,8 +3658,8 @@
         </p:nvSpPr>
         <p:spPr>
           <a:xfrm>
-            <a:off x="6457950" y="6356351"/>
-            <a:ext cx="2057400" cy="365125"/>
+            <a:off x="8610600" y="6356352"/>
+            <a:ext cx="2743200" cy="365125"/>
           </a:xfrm>
           <a:prstGeom prst="rect">
             <a:avLst/>
@@ -4064,35 +4089,6 @@
       </p:sp>
       <p:pic>
         <p:nvPicPr>
-          <p:cNvPr id="4" name="Content Placeholder 5">
-            <a:extLst>
-              <a:ext uri="{FF2B5EF4-FFF2-40B4-BE49-F238E27FC236}">
-                <a16:creationId xmlns:a16="http://schemas.microsoft.com/office/drawing/2014/main" id="{D11BF1CB-9FA0-4C4B-A2E0-7BB5A10006E1}"/>
-              </a:ext>
-            </a:extLst>
-          </p:cNvPr>
-          <p:cNvPicPr>
-            <a:picLocks noGrp="1" noChangeAspect="1"/>
-          </p:cNvPicPr>
-          <p:nvPr>
-            <p:ph sz="half" idx="2"/>
-          </p:nvPr>
-        </p:nvPicPr>
-        <p:blipFill>
-          <a:blip r:embed="rId3"/>
-          <a:stretch>
-            <a:fillRect/>
-          </a:stretch>
-        </p:blipFill>
-        <p:spPr>
-          <a:xfrm>
-            <a:off x="991665" y="3602038"/>
-            <a:ext cx="1755390" cy="1755390"/>
-          </a:xfrm>
-        </p:spPr>
-      </p:pic>
-      <p:pic>
-        <p:nvPicPr>
           <p:cNvPr id="5" name="Content Placeholder 5">
             <a:extLst>
               <a:ext uri="{FF2B5EF4-FFF2-40B4-BE49-F238E27FC236}">
@@ -4104,7 +4100,7 @@
             <a:picLocks noGrp="1" noChangeAspect="1"/>
           </p:cNvPicPr>
           <p:nvPr>
-            <p:ph sz="half" idx="2"/>
+            <p:ph sz="half" idx="4294967295"/>
           </p:nvPr>
         </p:nvPicPr>
         <p:blipFill>
@@ -4115,8 +4111,8 @@
         </p:blipFill>
         <p:spPr>
           <a:xfrm>
-            <a:off x="991665" y="3694113"/>
-            <a:ext cx="1755390" cy="1755390"/>
+            <a:off x="8155858" y="3602038"/>
+            <a:ext cx="1754188" cy="1755775"/>
           </a:xfrm>
         </p:spPr>
       </p:pic>
@@ -4289,7 +4285,7 @@
         </p:nvSpPr>
         <p:spPr>
           <a:xfrm>
-            <a:off x="628649" y="1825625"/>
+            <a:off x="2152650" y="1825625"/>
             <a:ext cx="4269921" cy="4351338"/>
           </a:xfrm>
         </p:spPr>
@@ -4364,7 +4360,7 @@
         </p:blipFill>
         <p:spPr>
           <a:xfrm>
-            <a:off x="5119781" y="1921712"/>
+            <a:off x="6643781" y="1921712"/>
             <a:ext cx="1755390" cy="1755390"/>
           </a:xfrm>
         </p:spPr>
@@ -4841,7 +4837,7 @@
         </p:nvSpPr>
         <p:spPr>
           <a:xfrm>
-            <a:off x="628649" y="1825625"/>
+            <a:off x="2152650" y="1825625"/>
             <a:ext cx="4269921" cy="4351338"/>
           </a:xfrm>
         </p:spPr>
@@ -5499,7 +5495,7 @@
         </p:blipFill>
         <p:spPr>
           <a:xfrm>
-            <a:off x="5012445" y="2000133"/>
+            <a:off x="7318109" y="2036116"/>
             <a:ext cx="2785768" cy="2785768"/>
           </a:xfrm>
         </p:spPr>
@@ -5589,7 +5585,7 @@
         <p:spPr/>
         <p:txBody>
           <a:bodyPr>
-            <a:normAutofit fontScale="92500" lnSpcReduction="10000"/>
+            <a:normAutofit/>
           </a:bodyPr>
           <a:lstStyle/>
           <a:p>
@@ -5674,7 +5670,7 @@
         </p:blipFill>
         <p:spPr>
           <a:xfrm>
-            <a:off x="4572631" y="2000133"/>
+            <a:off x="6096631" y="2000133"/>
             <a:ext cx="4285344" cy="3214008"/>
           </a:xfrm>
           <a:prstGeom prst="rect">
@@ -5850,7 +5846,7 @@
         </p:blipFill>
         <p:spPr>
           <a:xfrm>
-            <a:off x="286026" y="2330740"/>
+            <a:off x="1810026" y="2330740"/>
             <a:ext cx="4285344" cy="2196520"/>
           </a:xfrm>
         </p:spPr>
@@ -5871,9 +5867,16 @@
             <p:ph sz="half" idx="2"/>
           </p:nvPr>
         </p:nvSpPr>
-        <p:spPr/>
-        <p:txBody>
-          <a:bodyPr/>
+        <p:spPr>
+          <a:xfrm>
+            <a:off x="6153150" y="1565926"/>
+            <a:ext cx="4228824" cy="4351338"/>
+          </a:xfrm>
+        </p:spPr>
+        <p:txBody>
+          <a:bodyPr>
+            <a:normAutofit/>
+          </a:bodyPr>
           <a:lstStyle/>
           <a:p>
             <a:pPr marL="362880" indent="-362880"/>
@@ -5954,7 +5957,7 @@
         </p:nvSpPr>
         <p:spPr>
           <a:xfrm>
-            <a:off x="286026" y="6578166"/>
+            <a:off x="1810026" y="6578166"/>
             <a:ext cx="8327546" cy="238848"/>
           </a:xfrm>
           <a:prstGeom prst="rect">
@@ -6878,7 +6881,7 @@
         </p:nvSpPr>
         <p:spPr>
           <a:xfrm>
-            <a:off x="623888" y="1709739"/>
+            <a:off x="2147888" y="1709740"/>
             <a:ext cx="7965308" cy="2852737"/>
           </a:xfrm>
         </p:spPr>

</xml_diff>